<commit_message>
autre modification du diapo
</commit_message>
<xml_diff>
--- a/DoctolibGroupe51theverylastversion.pptx
+++ b/DoctolibGroupe51theverylastversion.pptx
@@ -10386,9 +10386,18 @@
         </p:spPr>
         <p:txBody>
           <a:bodyPr>
-            <a:normAutofit/>
+            <a:noAutofit/>
           </a:bodyPr>
           <a:lstStyle/>
+          <a:p>
+            <a:r>
+              <a:rPr lang="fr-FR" sz="2800" dirty="0"/>
+              <a:t>Création d’un barème</a:t>
+            </a:r>
+            <a:endParaRPr lang="fr-FR" sz="2800" dirty="0">
+              <a:hlinkClick r:id="rId2"/>
+            </a:endParaRPr>
+          </a:p>
           <a:p>
             <a:r>
               <a:rPr lang="fr-FR" sz="2800" dirty="0">
@@ -10397,6 +10406,9 @@
               <a:t>http://138.195.245.147/</a:t>
             </a:r>
             <a:endParaRPr lang="fr-FR" sz="2800" dirty="0"/>
+          </a:p>
+          <a:p>
+            <a:endParaRPr lang="fr-FR" sz="3600" dirty="0"/>
           </a:p>
         </p:txBody>
       </p:sp>
@@ -11841,13 +11853,6 @@
               <a:t>Debugage</a:t>
             </a:r>
             <a:endParaRPr lang="fr-FR" sz="2400" dirty="0"/>
-          </a:p>
-          <a:p>
-            <a:r>
-              <a:rPr lang="fr-FR" sz="2400" dirty="0"/>
-              <a:t>Application à un candidat</a:t>
-            </a:r>
-            <a:endParaRPr lang="fr-FR" dirty="0"/>
           </a:p>
         </p:txBody>
       </p:sp>

</xml_diff>